<commit_message>
Add metric definitions to dashboard
</commit_message>
<xml_diff>
--- a/dashboards/eda.pptx
+++ b/dashboards/eda.pptx
@@ -263,7 +263,7 @@
           <a:p>
             <a:fld id="{EED1C14C-A143-42F5-B247-D0E800131009}" type="datetimeFigureOut">
               <a:rPr lang="en-US" smtClean="0"/>
-              <a:t>2/15/26</a:t>
+              <a:t>2/16/26</a:t>
             </a:fld>
             <a:endParaRPr lang="en-US"/>
           </a:p>
@@ -461,7 +461,7 @@
           <a:p>
             <a:fld id="{EED1C14C-A143-42F5-B247-D0E800131009}" type="datetimeFigureOut">
               <a:rPr lang="en-US" smtClean="0"/>
-              <a:t>2/15/26</a:t>
+              <a:t>2/16/26</a:t>
             </a:fld>
             <a:endParaRPr lang="en-US"/>
           </a:p>
@@ -669,7 +669,7 @@
           <a:p>
             <a:fld id="{EED1C14C-A143-42F5-B247-D0E800131009}" type="datetimeFigureOut">
               <a:rPr lang="en-US" smtClean="0"/>
-              <a:t>2/15/26</a:t>
+              <a:t>2/16/26</a:t>
             </a:fld>
             <a:endParaRPr lang="en-US"/>
           </a:p>
@@ -867,7 +867,7 @@
           <a:p>
             <a:fld id="{EED1C14C-A143-42F5-B247-D0E800131009}" type="datetimeFigureOut">
               <a:rPr lang="en-US" smtClean="0"/>
-              <a:t>2/15/26</a:t>
+              <a:t>2/16/26</a:t>
             </a:fld>
             <a:endParaRPr lang="en-US"/>
           </a:p>
@@ -1142,7 +1142,7 @@
           <a:p>
             <a:fld id="{EED1C14C-A143-42F5-B247-D0E800131009}" type="datetimeFigureOut">
               <a:rPr lang="en-US" smtClean="0"/>
-              <a:t>2/15/26</a:t>
+              <a:t>2/16/26</a:t>
             </a:fld>
             <a:endParaRPr lang="en-US"/>
           </a:p>
@@ -1407,7 +1407,7 @@
           <a:p>
             <a:fld id="{EED1C14C-A143-42F5-B247-D0E800131009}" type="datetimeFigureOut">
               <a:rPr lang="en-US" smtClean="0"/>
-              <a:t>2/15/26</a:t>
+              <a:t>2/16/26</a:t>
             </a:fld>
             <a:endParaRPr lang="en-US"/>
           </a:p>
@@ -1819,7 +1819,7 @@
           <a:p>
             <a:fld id="{EED1C14C-A143-42F5-B247-D0E800131009}" type="datetimeFigureOut">
               <a:rPr lang="en-US" smtClean="0"/>
-              <a:t>2/15/26</a:t>
+              <a:t>2/16/26</a:t>
             </a:fld>
             <a:endParaRPr lang="en-US"/>
           </a:p>
@@ -1960,7 +1960,7 @@
           <a:p>
             <a:fld id="{EED1C14C-A143-42F5-B247-D0E800131009}" type="datetimeFigureOut">
               <a:rPr lang="en-US" smtClean="0"/>
-              <a:t>2/15/26</a:t>
+              <a:t>2/16/26</a:t>
             </a:fld>
             <a:endParaRPr lang="en-US"/>
           </a:p>
@@ -2073,7 +2073,7 @@
           <a:p>
             <a:fld id="{EED1C14C-A143-42F5-B247-D0E800131009}" type="datetimeFigureOut">
               <a:rPr lang="en-US" smtClean="0"/>
-              <a:t>2/15/26</a:t>
+              <a:t>2/16/26</a:t>
             </a:fld>
             <a:endParaRPr lang="en-US"/>
           </a:p>
@@ -2384,7 +2384,7 @@
           <a:p>
             <a:fld id="{EED1C14C-A143-42F5-B247-D0E800131009}" type="datetimeFigureOut">
               <a:rPr lang="en-US" smtClean="0"/>
-              <a:t>2/15/26</a:t>
+              <a:t>2/16/26</a:t>
             </a:fld>
             <a:endParaRPr lang="en-US"/>
           </a:p>
@@ -2672,7 +2672,7 @@
           <a:p>
             <a:fld id="{EED1C14C-A143-42F5-B247-D0E800131009}" type="datetimeFigureOut">
               <a:rPr lang="en-US" smtClean="0"/>
-              <a:t>2/15/26</a:t>
+              <a:t>2/16/26</a:t>
             </a:fld>
             <a:endParaRPr lang="en-US"/>
           </a:p>
@@ -2913,7 +2913,7 @@
           <a:p>
             <a:fld id="{EED1C14C-A143-42F5-B247-D0E800131009}" type="datetimeFigureOut">
               <a:rPr lang="en-US" smtClean="0"/>
-              <a:t>2/15/26</a:t>
+              <a:t>2/16/26</a:t>
             </a:fld>
             <a:endParaRPr lang="en-US"/>
           </a:p>
@@ -3335,7 +3335,7 @@
           <p:cNvPr id="2" name="slide1">
             <a:extLst>
               <a:ext uri="{FF2B5EF4-FFF2-40B4-BE49-F238E27FC236}">
-                <a16:creationId xmlns:a16="http://schemas.microsoft.com/office/drawing/2014/main" id="{3C1B6B01-7280-4142-B6AB-DDD61FB127F0}"/>
+                <a16:creationId xmlns:a16="http://schemas.microsoft.com/office/drawing/2014/main" id="{71202560-D1E9-4592-882C-D5C30A65214B}"/>
               </a:ext>
             </a:extLst>
           </p:cNvPr>
@@ -3353,7 +3353,7 @@
           <a:p>
             <a:r>
               <a:rPr lang="en-US" dirty="0"/>
-              <a:t>Covid Deaths – An Historical Analysis</a:t>
+              <a:t>Covid Deaths – A Historical Analysis</a:t>
             </a:r>
             <a:endParaRPr dirty="0"/>
           </a:p>
@@ -3364,7 +3364,7 @@
           <p:cNvPr id="3" name="slide1">
             <a:extLst>
               <a:ext uri="{FF2B5EF4-FFF2-40B4-BE49-F238E27FC236}">
-                <a16:creationId xmlns:a16="http://schemas.microsoft.com/office/drawing/2014/main" id="{A329C60C-1A95-42C8-B2D2-4B4C7D335ABC}"/>
+                <a16:creationId xmlns:a16="http://schemas.microsoft.com/office/drawing/2014/main" id="{204E12D1-1A9C-4E81-A245-EE3E3F9E9D63}"/>
               </a:ext>
             </a:extLst>
           </p:cNvPr>
@@ -3381,8 +3381,14 @@
           <a:lstStyle/>
           <a:p>
             <a:r>
-              <a:t>File created on: 2/15/26 9:46:52 PM EST</a:t>
-            </a:r>
+              <a:rPr dirty="0"/>
+              <a:t>2/16/2</a:t>
+            </a:r>
+            <a:r>
+              <a:rPr lang="en-US" dirty="0"/>
+              <a:t>6</a:t>
+            </a:r>
+            <a:endParaRPr dirty="0"/>
           </a:p>
         </p:txBody>
       </p:sp>
@@ -3421,7 +3427,7 @@
           <p:cNvPr id="2" name="slide2" descr="Dashboard - Covid Deaths">
             <a:extLst>
               <a:ext uri="{FF2B5EF4-FFF2-40B4-BE49-F238E27FC236}">
-                <a16:creationId xmlns:a16="http://schemas.microsoft.com/office/drawing/2014/main" id="{B9134A27-505C-42D8-918D-9BB9C8DC10AE}"/>
+                <a16:creationId xmlns:a16="http://schemas.microsoft.com/office/drawing/2014/main" id="{F9FD0CA2-6F48-4D99-ACFE-41C80A9FCA8D}"/>
               </a:ext>
             </a:extLst>
           </p:cNvPr>
@@ -3487,7 +3493,7 @@
           <p:cNvPr id="3" name="slide3" descr="Deaths Time Series">
             <a:extLst>
               <a:ext uri="{FF2B5EF4-FFF2-40B4-BE49-F238E27FC236}">
-                <a16:creationId xmlns:a16="http://schemas.microsoft.com/office/drawing/2014/main" id="{D9923FE8-22C3-4FAF-8AC6-13E173D25223}"/>
+                <a16:creationId xmlns:a16="http://schemas.microsoft.com/office/drawing/2014/main" id="{BCCF5278-64D6-460C-9897-3058ABDBF0FA}"/>
               </a:ext>
             </a:extLst>
           </p:cNvPr>
@@ -3510,8 +3516,8 @@
         </p:blipFill>
         <p:spPr>
           <a:xfrm>
-            <a:off x="0" y="381000"/>
-            <a:ext cx="12192000" cy="6096000"/>
+            <a:off x="786063" y="0"/>
+            <a:ext cx="10619874" cy="6858000"/>
           </a:xfrm>
           <a:prstGeom prst="rect">
             <a:avLst/>
@@ -3553,7 +3559,7 @@
           <p:cNvPr id="4" name="slide4" descr="Deaths vs Staffing">
             <a:extLst>
               <a:ext uri="{FF2B5EF4-FFF2-40B4-BE49-F238E27FC236}">
-                <a16:creationId xmlns:a16="http://schemas.microsoft.com/office/drawing/2014/main" id="{84728389-CA53-497F-8F72-E8BA4CB04910}"/>
+                <a16:creationId xmlns:a16="http://schemas.microsoft.com/office/drawing/2014/main" id="{C5629C1A-AAFE-4575-A700-959C75C390B1}"/>
               </a:ext>
             </a:extLst>
           </p:cNvPr>
@@ -3576,8 +3582,8 @@
         </p:blipFill>
         <p:spPr>
           <a:xfrm>
-            <a:off x="0" y="403848"/>
-            <a:ext cx="12192000" cy="6050302"/>
+            <a:off x="745958" y="0"/>
+            <a:ext cx="10700084" cy="6858000"/>
           </a:xfrm>
           <a:prstGeom prst="rect">
             <a:avLst/>
@@ -3619,7 +3625,7 @@
           <p:cNvPr id="5" name="slide5" descr="Deaths vs Mask Adherence">
             <a:extLst>
               <a:ext uri="{FF2B5EF4-FFF2-40B4-BE49-F238E27FC236}">
-                <a16:creationId xmlns:a16="http://schemas.microsoft.com/office/drawing/2014/main" id="{1E94F4A6-3F19-472A-A837-65FC358AD437}"/>
+                <a16:creationId xmlns:a16="http://schemas.microsoft.com/office/drawing/2014/main" id="{E4120F5A-C68C-4318-BD5A-B6C00C690412}"/>
               </a:ext>
             </a:extLst>
           </p:cNvPr>
@@ -3642,8 +3648,8 @@
         </p:blipFill>
         <p:spPr>
           <a:xfrm>
-            <a:off x="0" y="403848"/>
-            <a:ext cx="12192000" cy="6050302"/>
+            <a:off x="745958" y="0"/>
+            <a:ext cx="10700084" cy="6858000"/>
           </a:xfrm>
           <a:prstGeom prst="rect">
             <a:avLst/>

</xml_diff>

<commit_message>
Improve aggregation method for scatter plots
</commit_message>
<xml_diff>
--- a/dashboards/eda.pptx
+++ b/dashboards/eda.pptx
@@ -3335,7 +3335,7 @@
           <p:cNvPr id="2" name="slide1">
             <a:extLst>
               <a:ext uri="{FF2B5EF4-FFF2-40B4-BE49-F238E27FC236}">
-                <a16:creationId xmlns:a16="http://schemas.microsoft.com/office/drawing/2014/main" id="{71202560-D1E9-4592-882C-D5C30A65214B}"/>
+                <a16:creationId xmlns:a16="http://schemas.microsoft.com/office/drawing/2014/main" id="{29300886-52ED-4719-BBAC-B1A13FB85380}"/>
               </a:ext>
             </a:extLst>
           </p:cNvPr>
@@ -3364,7 +3364,7 @@
           <p:cNvPr id="3" name="slide1">
             <a:extLst>
               <a:ext uri="{FF2B5EF4-FFF2-40B4-BE49-F238E27FC236}">
-                <a16:creationId xmlns:a16="http://schemas.microsoft.com/office/drawing/2014/main" id="{204E12D1-1A9C-4E81-A245-EE3E3F9E9D63}"/>
+                <a16:creationId xmlns:a16="http://schemas.microsoft.com/office/drawing/2014/main" id="{FD2E874E-5B67-4E7A-A073-204753C7AF76}"/>
               </a:ext>
             </a:extLst>
           </p:cNvPr>
@@ -3382,13 +3382,8 @@
           <a:p>
             <a:r>
               <a:rPr dirty="0"/>
-              <a:t>2/16/2</a:t>
-            </a:r>
-            <a:r>
-              <a:rPr lang="en-US" dirty="0"/>
-              <a:t>6</a:t>
-            </a:r>
-            <a:endParaRPr dirty="0"/>
+              <a:t>2/16/26</a:t>
+            </a:r>
           </a:p>
         </p:txBody>
       </p:sp>
@@ -3427,7 +3422,7 @@
           <p:cNvPr id="2" name="slide2" descr="Dashboard - Covid Deaths">
             <a:extLst>
               <a:ext uri="{FF2B5EF4-FFF2-40B4-BE49-F238E27FC236}">
-                <a16:creationId xmlns:a16="http://schemas.microsoft.com/office/drawing/2014/main" id="{F9FD0CA2-6F48-4D99-ACFE-41C80A9FCA8D}"/>
+                <a16:creationId xmlns:a16="http://schemas.microsoft.com/office/drawing/2014/main" id="{85198D1F-E46D-4FBC-A1D5-499E4E0656E4}"/>
               </a:ext>
             </a:extLst>
           </p:cNvPr>
@@ -3493,7 +3488,7 @@
           <p:cNvPr id="3" name="slide3" descr="Deaths Time Series">
             <a:extLst>
               <a:ext uri="{FF2B5EF4-FFF2-40B4-BE49-F238E27FC236}">
-                <a16:creationId xmlns:a16="http://schemas.microsoft.com/office/drawing/2014/main" id="{BCCF5278-64D6-460C-9897-3058ABDBF0FA}"/>
+                <a16:creationId xmlns:a16="http://schemas.microsoft.com/office/drawing/2014/main" id="{FE8A6777-F4A2-43C8-B5F4-F30E57BC10CF}"/>
               </a:ext>
             </a:extLst>
           </p:cNvPr>
@@ -3516,8 +3511,8 @@
         </p:blipFill>
         <p:spPr>
           <a:xfrm>
-            <a:off x="786063" y="0"/>
-            <a:ext cx="10619874" cy="6858000"/>
+            <a:off x="710477" y="0"/>
+            <a:ext cx="10771046" cy="6858000"/>
           </a:xfrm>
           <a:prstGeom prst="rect">
             <a:avLst/>
@@ -3559,7 +3554,7 @@
           <p:cNvPr id="4" name="slide4" descr="Deaths vs Staffing">
             <a:extLst>
               <a:ext uri="{FF2B5EF4-FFF2-40B4-BE49-F238E27FC236}">
-                <a16:creationId xmlns:a16="http://schemas.microsoft.com/office/drawing/2014/main" id="{C5629C1A-AAFE-4575-A700-959C75C390B1}"/>
+                <a16:creationId xmlns:a16="http://schemas.microsoft.com/office/drawing/2014/main" id="{D2F63A5B-C1DA-4727-AA43-CD9ABB3216A0}"/>
               </a:ext>
             </a:extLst>
           </p:cNvPr>
@@ -3582,8 +3577,8 @@
         </p:blipFill>
         <p:spPr>
           <a:xfrm>
-            <a:off x="745958" y="0"/>
-            <a:ext cx="10700084" cy="6858000"/>
+            <a:off x="3057746" y="0"/>
+            <a:ext cx="6076507" cy="6858000"/>
           </a:xfrm>
           <a:prstGeom prst="rect">
             <a:avLst/>
@@ -3625,7 +3620,7 @@
           <p:cNvPr id="5" name="slide5" descr="Deaths vs Mask Adherence">
             <a:extLst>
               <a:ext uri="{FF2B5EF4-FFF2-40B4-BE49-F238E27FC236}">
-                <a16:creationId xmlns:a16="http://schemas.microsoft.com/office/drawing/2014/main" id="{E4120F5A-C68C-4318-BD5A-B6C00C690412}"/>
+                <a16:creationId xmlns:a16="http://schemas.microsoft.com/office/drawing/2014/main" id="{D36F1599-777C-47FF-B36C-7AF36A29BFB0}"/>
               </a:ext>
             </a:extLst>
           </p:cNvPr>
@@ -3648,8 +3643,8 @@
         </p:blipFill>
         <p:spPr>
           <a:xfrm>
-            <a:off x="745958" y="0"/>
-            <a:ext cx="10700084" cy="6858000"/>
+            <a:off x="3050172" y="0"/>
+            <a:ext cx="6091655" cy="6858000"/>
           </a:xfrm>
           <a:prstGeom prst="rect">
             <a:avLst/>

</xml_diff>